<commit_message>
Updated the slidedeck and readme
</commit_message>
<xml_diff>
--- a/Docs/Azure Marketplace SaaS Integration overview.pptx
+++ b/Docs/Azure Marketplace SaaS Integration overview.pptx
@@ -6119,7 +6119,7 @@
           <a:p>
             <a:fld id="{FB9E0EC2-E6CF-4C59-B7BE-6DC3ABAA7ED0}" type="datetimeFigureOut">
               <a:rPr lang="en-US" smtClean="0"/>
-              <a:t>9/17/2019</a:t>
+              <a:t>9/18/2019</a:t>
             </a:fld>
             <a:endParaRPr lang="en-US"/>
           </a:p>
@@ -6317,7 +6317,7 @@
           <a:p>
             <a:fld id="{FB9E0EC2-E6CF-4C59-B7BE-6DC3ABAA7ED0}" type="datetimeFigureOut">
               <a:rPr lang="en-US" smtClean="0"/>
-              <a:t>9/17/2019</a:t>
+              <a:t>9/18/2019</a:t>
             </a:fld>
             <a:endParaRPr lang="en-US"/>
           </a:p>
@@ -6525,7 +6525,7 @@
           <a:p>
             <a:fld id="{FB9E0EC2-E6CF-4C59-B7BE-6DC3ABAA7ED0}" type="datetimeFigureOut">
               <a:rPr lang="en-US" smtClean="0"/>
-              <a:t>9/17/2019</a:t>
+              <a:t>9/18/2019</a:t>
             </a:fld>
             <a:endParaRPr lang="en-US"/>
           </a:p>
@@ -6723,7 +6723,7 @@
           <a:p>
             <a:fld id="{FB9E0EC2-E6CF-4C59-B7BE-6DC3ABAA7ED0}" type="datetimeFigureOut">
               <a:rPr lang="en-US" smtClean="0"/>
-              <a:t>9/17/2019</a:t>
+              <a:t>9/18/2019</a:t>
             </a:fld>
             <a:endParaRPr lang="en-US"/>
           </a:p>
@@ -6998,7 +6998,7 @@
           <a:p>
             <a:fld id="{FB9E0EC2-E6CF-4C59-B7BE-6DC3ABAA7ED0}" type="datetimeFigureOut">
               <a:rPr lang="en-US" smtClean="0"/>
-              <a:t>9/17/2019</a:t>
+              <a:t>9/18/2019</a:t>
             </a:fld>
             <a:endParaRPr lang="en-US"/>
           </a:p>
@@ -7263,7 +7263,7 @@
           <a:p>
             <a:fld id="{FB9E0EC2-E6CF-4C59-B7BE-6DC3ABAA7ED0}" type="datetimeFigureOut">
               <a:rPr lang="en-US" smtClean="0"/>
-              <a:t>9/17/2019</a:t>
+              <a:t>9/18/2019</a:t>
             </a:fld>
             <a:endParaRPr lang="en-US"/>
           </a:p>
@@ -7675,7 +7675,7 @@
           <a:p>
             <a:fld id="{FB9E0EC2-E6CF-4C59-B7BE-6DC3ABAA7ED0}" type="datetimeFigureOut">
               <a:rPr lang="en-US" smtClean="0"/>
-              <a:t>9/17/2019</a:t>
+              <a:t>9/18/2019</a:t>
             </a:fld>
             <a:endParaRPr lang="en-US"/>
           </a:p>
@@ -7816,7 +7816,7 @@
           <a:p>
             <a:fld id="{FB9E0EC2-E6CF-4C59-B7BE-6DC3ABAA7ED0}" type="datetimeFigureOut">
               <a:rPr lang="en-US" smtClean="0"/>
-              <a:t>9/17/2019</a:t>
+              <a:t>9/18/2019</a:t>
             </a:fld>
             <a:endParaRPr lang="en-US"/>
           </a:p>
@@ -7929,7 +7929,7 @@
           <a:p>
             <a:fld id="{FB9E0EC2-E6CF-4C59-B7BE-6DC3ABAA7ED0}" type="datetimeFigureOut">
               <a:rPr lang="en-US" smtClean="0"/>
-              <a:t>9/17/2019</a:t>
+              <a:t>9/18/2019</a:t>
             </a:fld>
             <a:endParaRPr lang="en-US"/>
           </a:p>
@@ -8240,7 +8240,7 @@
           <a:p>
             <a:fld id="{FB9E0EC2-E6CF-4C59-B7BE-6DC3ABAA7ED0}" type="datetimeFigureOut">
               <a:rPr lang="en-US" smtClean="0"/>
-              <a:t>9/17/2019</a:t>
+              <a:t>9/18/2019</a:t>
             </a:fld>
             <a:endParaRPr lang="en-US"/>
           </a:p>
@@ -8528,7 +8528,7 @@
           <a:p>
             <a:fld id="{FB9E0EC2-E6CF-4C59-B7BE-6DC3ABAA7ED0}" type="datetimeFigureOut">
               <a:rPr lang="en-US" smtClean="0"/>
-              <a:t>9/17/2019</a:t>
+              <a:t>9/18/2019</a:t>
             </a:fld>
             <a:endParaRPr lang="en-US"/>
           </a:p>
@@ -8769,7 +8769,7 @@
           <a:p>
             <a:fld id="{FB9E0EC2-E6CF-4C59-B7BE-6DC3ABAA7ED0}" type="datetimeFigureOut">
               <a:rPr lang="en-US" smtClean="0"/>
-              <a:t>9/17/2019</a:t>
+              <a:t>9/18/2019</a:t>
             </a:fld>
             <a:endParaRPr lang="en-US"/>
           </a:p>
@@ -12314,7 +12314,7 @@
         </p:nvGrpSpPr>
         <p:grpSpPr>
           <a:xfrm flipH="1">
-            <a:off x="4536210" y="2696200"/>
+            <a:off x="4534425" y="2420073"/>
             <a:ext cx="1583121" cy="307777"/>
             <a:chOff x="1073601" y="2107982"/>
             <a:chExt cx="1714960" cy="307777"/>
@@ -13955,7 +13955,7 @@
         </p:nvGrpSpPr>
         <p:grpSpPr>
           <a:xfrm flipH="1">
-            <a:off x="953265" y="2179296"/>
+            <a:off x="951831" y="2627076"/>
             <a:ext cx="5157898" cy="307777"/>
             <a:chOff x="1073601" y="2133392"/>
             <a:chExt cx="1714960" cy="307777"/>
@@ -14053,7 +14053,7 @@
         </p:nvGrpSpPr>
         <p:grpSpPr>
           <a:xfrm>
-            <a:off x="962509" y="2418153"/>
+            <a:off x="961075" y="2865933"/>
             <a:ext cx="5156821" cy="307777"/>
             <a:chOff x="1073601" y="2081111"/>
             <a:chExt cx="1714960" cy="307777"/>
@@ -14116,7 +14116,7 @@
           <p:spPr>
             <a:xfrm>
               <a:off x="1116816" y="2081111"/>
-              <a:ext cx="820292" cy="307777"/>
+              <a:ext cx="295528" cy="307777"/>
             </a:xfrm>
             <a:prstGeom prst="rect">
               <a:avLst/>
@@ -14131,7 +14131,7 @@
             <a:p>
               <a:r>
                 <a:rPr lang="en-US" sz="1400" dirty="0"/>
-                <a:t>Redirect to landing page</a:t>
+                <a:t>Post form</a:t>
               </a:r>
             </a:p>
           </p:txBody>
@@ -14151,7 +14151,7 @@
         </p:nvGrpSpPr>
         <p:grpSpPr>
           <a:xfrm>
-            <a:off x="6111314" y="2781315"/>
+            <a:off x="6102320" y="2294771"/>
             <a:ext cx="1093646" cy="307777"/>
             <a:chOff x="1073601" y="2084852"/>
             <a:chExt cx="1714960" cy="307777"/>
@@ -14881,7 +14881,7 @@
         </p:nvGrpSpPr>
         <p:grpSpPr>
           <a:xfrm flipH="1">
-            <a:off x="4512879" y="2847251"/>
+            <a:off x="4519619" y="2289164"/>
             <a:ext cx="1583121" cy="307777"/>
             <a:chOff x="1073601" y="2107982"/>
             <a:chExt cx="1714960" cy="307777"/>
@@ -16024,7 +16024,7 @@
         </p:nvGrpSpPr>
         <p:grpSpPr>
           <a:xfrm flipH="1">
-            <a:off x="953265" y="2309084"/>
+            <a:off x="941874" y="2545123"/>
             <a:ext cx="5157898" cy="307777"/>
             <a:chOff x="1073601" y="2133392"/>
             <a:chExt cx="1714960" cy="307777"/>
@@ -16122,7 +16122,7 @@
         </p:nvGrpSpPr>
         <p:grpSpPr>
           <a:xfrm>
-            <a:off x="962509" y="2547941"/>
+            <a:off x="952618" y="2760565"/>
             <a:ext cx="5156821" cy="307777"/>
             <a:chOff x="1073601" y="2081111"/>
             <a:chExt cx="1714960" cy="307777"/>
@@ -16185,7 +16185,7 @@
           <p:spPr>
             <a:xfrm>
               <a:off x="1116816" y="2081111"/>
-              <a:ext cx="820292" cy="307777"/>
+              <a:ext cx="295528" cy="307777"/>
             </a:xfrm>
             <a:prstGeom prst="rect">
               <a:avLst/>
@@ -16200,7 +16200,7 @@
             <a:p>
               <a:r>
                 <a:rPr lang="en-US" sz="1400" dirty="0"/>
-                <a:t>Redirect to landing page</a:t>
+                <a:t>Post form</a:t>
               </a:r>
             </a:p>
           </p:txBody>

</xml_diff>